<commit_message>
passe sur la relecture de thierry de w5-s1/2/3
</commit_message>
<xml_diff>
--- a/w5/w5-s1-av-slide1.pptx
+++ b/w5/w5-s1-av-slide1.pptx
@@ -581,7 +581,7 @@
           </a:ln>
           <a:extLst>
             <a:ext uri="{909E8E84-426E-40dd-AFC4-6F175D3DCCD1}">
-              <a14:hiddenFill xmlns="" xmlns:a14="http://schemas.microsoft.com/office/drawing/2010/main">
+              <a14:hiddenFill xmlns:a14="http://schemas.microsoft.com/office/drawing/2010/main" xmlns="">
                 <a:solidFill>
                   <a:srgbClr val="FFFFFF"/>
                 </a:solidFill>
@@ -3596,14 +3596,14 @@
           </a:ln>
           <a:extLst>
             <a:ext uri="{909E8E84-426E-40dd-AFC4-6F175D3DCCD1}">
-              <a14:hiddenFill xmlns="" xmlns:a14="http://schemas.microsoft.com/office/drawing/2010/main">
+              <a14:hiddenFill xmlns:a14="http://schemas.microsoft.com/office/drawing/2010/main" xmlns="">
                 <a:solidFill>
                   <a:srgbClr val="FFFFFF"/>
                 </a:solidFill>
               </a14:hiddenFill>
             </a:ext>
             <a:ext uri="{91240B29-F687-4f45-9708-019B960494DF}">
-              <a14:hiddenLine xmlns="" xmlns:a14="http://schemas.microsoft.com/office/drawing/2010/main" w="9525">
+              <a14:hiddenLine xmlns:a14="http://schemas.microsoft.com/office/drawing/2010/main" xmlns="" w="9525">
                 <a:solidFill>
                   <a:srgbClr val="000000"/>
                 </a:solidFill>
@@ -3654,14 +3654,14 @@
           </a:ln>
           <a:extLst>
             <a:ext uri="{909E8E84-426E-40dd-AFC4-6F175D3DCCD1}">
-              <a14:hiddenFill xmlns="" xmlns:a14="http://schemas.microsoft.com/office/drawing/2010/main">
+              <a14:hiddenFill xmlns:a14="http://schemas.microsoft.com/office/drawing/2010/main" xmlns="">
                 <a:solidFill>
                   <a:srgbClr val="FFFFFF"/>
                 </a:solidFill>
               </a14:hiddenFill>
             </a:ext>
             <a:ext uri="{91240B29-F687-4f45-9708-019B960494DF}">
-              <a14:hiddenLine xmlns="" xmlns:a14="http://schemas.microsoft.com/office/drawing/2010/main" w="9525">
+              <a14:hiddenLine xmlns:a14="http://schemas.microsoft.com/office/drawing/2010/main" xmlns="" w="9525">
                 <a:solidFill>
                   <a:srgbClr val="000000"/>
                 </a:solidFill>
@@ -5506,7 +5506,7 @@
                 <a:latin typeface="Courier New" panose="02070309020205020404" pitchFamily="49" charset="0"/>
                 <a:cs typeface="Courier New" panose="02070309020205020404" pitchFamily="49" charset="0"/>
               </a:rPr>
-              <a:t>obj</a:t>
+              <a:t>it</a:t>
             </a:r>
             <a:r>
               <a:rPr lang="fr-FR" sz="3600" dirty="0" smtClean="0">
@@ -5553,19 +5553,16 @@
               <a:t>(</a:t>
             </a:r>
             <a:r>
-              <a:rPr lang="fr-FR" sz="3600" dirty="0" err="1" smtClean="0">
+              <a:rPr lang="fr-FR" sz="3600" smtClean="0">
                 <a:latin typeface="Courier New" panose="02070309020205020404" pitchFamily="49" charset="0"/>
                 <a:cs typeface="Courier New" panose="02070309020205020404" pitchFamily="49" charset="0"/>
               </a:rPr>
-              <a:t>obj</a:t>
-            </a:r>
-            <a:r>
-              <a:rPr lang="fr-FR" sz="3600" dirty="0">
-                <a:latin typeface="Courier New" panose="02070309020205020404" pitchFamily="49" charset="0"/>
-                <a:cs typeface="Courier New" panose="02070309020205020404" pitchFamily="49" charset="0"/>
-              </a:rPr>
-              <a:t>)</a:t>
-            </a:r>
+              <a:t>it)</a:t>
+            </a:r>
+            <a:endParaRPr lang="fr-FR" sz="3600" dirty="0">
+              <a:latin typeface="Courier New" panose="02070309020205020404" pitchFamily="49" charset="0"/>
+              <a:cs typeface="Courier New" panose="02070309020205020404" pitchFamily="49" charset="0"/>
+            </a:endParaRPr>
           </a:p>
           <a:p>
             <a:endParaRPr lang="fr-FR" sz="4400" dirty="0" smtClean="0">

</xml_diff>